<commit_message>
Added notes to ppt
</commit_message>
<xml_diff>
--- a/MGT5824-Tech-based Entrepreneurship/Assignments/Milestone #2 - Venture Solution Prototype & Social Affordances/gasser18-milestone2_prototype_and_social_affordances_slides.pptx
+++ b/MGT5824-Tech-based Entrepreneurship/Assignments/Milestone #2 - Venture Solution Prototype & Social Affordances/gasser18-milestone2_prototype_and_social_affordances_slides.pptx
@@ -3127,6 +3127,24 @@
               <a:tabLst/>
               <a:defRPr/>
             </a:pPr>
+            <a:r>
+              <a:rPr lang="en-US" sz="1800" kern="0" dirty="0">
+                <a:effectLst/>
+                <a:latin typeface="+mj-lt"/>
+                <a:ea typeface="Times New Roman" panose="02020603050405020304" pitchFamily="18" charset="0"/>
+                <a:cs typeface="Arial" panose="020B0604020202020204" pitchFamily="34" charset="0"/>
+              </a:rPr>
+              <a:t>By prioritizing user experience, considering social implications and ethical considerations, and leveraging object recognition technology, the AI lawn mowing scheduling mobile app offers a convenient and responsible solution for lawn care. It provides users with a user-friendly interface, contributes to environmental sustainability, and addresses potential job displacement concerns. The app's use of object recognition technology improves measurement accuracy, making scheduling more efficient and optimizing the mowing process. While continuously evaluating and pushing technological boundaries, it aims to provide a positive impact on users and the broader </a:t>
+            </a:r>
+            <a:r>
+              <a:rPr lang="en-US" sz="1800" kern="0">
+                <a:effectLst/>
+                <a:latin typeface="+mj-lt"/>
+                <a:ea typeface="Times New Roman" panose="02020603050405020304" pitchFamily="18" charset="0"/>
+                <a:cs typeface="Arial" panose="020B0604020202020204" pitchFamily="34" charset="0"/>
+              </a:rPr>
+              <a:t>community.</a:t>
+            </a:r>
             <a:endParaRPr lang="en-US" sz="1800" kern="0" dirty="0">
               <a:effectLst/>
               <a:latin typeface="+mj-lt"/>
@@ -28895,11 +28913,11 @@
   <p:clrMapOvr>
     <a:masterClrMapping/>
   </p:clrMapOvr>
-  <mc:AlternateContent xmlns:mc="http://schemas.openxmlformats.org/markup-compatibility/2006">
-    <mc:Choice xmlns:p14="http://schemas.microsoft.com/office/powerpoint/2010/main" Requires="p14">
+  <mc:AlternateContent xmlns:mc="http://schemas.openxmlformats.org/markup-compatibility/2006" xmlns:p14="http://schemas.microsoft.com/office/powerpoint/2010/main">
+    <mc:Choice Requires="p14">
       <p:transition p14:dur="0" advTm="18761"/>
     </mc:Choice>
-    <mc:Fallback>
+    <mc:Fallback xmlns="">
       <p:transition advTm="18761"/>
     </mc:Fallback>
   </mc:AlternateContent>

</xml_diff>

<commit_message>
Added descriptions for slides 2-6 in the Notes section.
</commit_message>
<xml_diff>
--- a/MGT5824-Tech-based Entrepreneurship/Assignments/Milestone #2 - Venture Solution Prototype & Social Affordances/gasser18-milestone2_prototype_and_social_affordances_slides.pptx
+++ b/MGT5824-Tech-based Entrepreneurship/Assignments/Milestone #2 - Venture Solution Prototype & Social Affordances/gasser18-milestone2_prototype_and_social_affordances_slides.pptx
@@ -1457,33 +1457,12 @@
               <a:tabLst/>
               <a:defRPr/>
             </a:pPr>
-            <a:r>
-              <a:rPr lang="en-US" sz="1800" kern="0" dirty="0">
-                <a:effectLst/>
-                <a:latin typeface="+mj-lt"/>
-                <a:ea typeface="Times New Roman" panose="02020603050405020304" pitchFamily="18" charset="0"/>
-                <a:cs typeface="Arial" panose="020B0604020202020204" pitchFamily="34" charset="0"/>
-              </a:rPr>
-              <a:t>https://</a:t>
-            </a:r>
-            <a:r>
-              <a:rPr lang="en-US" sz="1800" kern="0" dirty="0" err="1">
-                <a:effectLst/>
-                <a:latin typeface="+mj-lt"/>
-                <a:ea typeface="Times New Roman" panose="02020603050405020304" pitchFamily="18" charset="0"/>
-                <a:cs typeface="Arial" panose="020B0604020202020204" pitchFamily="34" charset="0"/>
-              </a:rPr>
-              <a:t>aws.amazon.com</a:t>
-            </a:r>
-            <a:r>
-              <a:rPr lang="en-US" sz="1800" kern="0" dirty="0">
-                <a:effectLst/>
-                <a:latin typeface="+mj-lt"/>
-                <a:ea typeface="Times New Roman" panose="02020603050405020304" pitchFamily="18" charset="0"/>
-                <a:cs typeface="Arial" panose="020B0604020202020204" pitchFamily="34" charset="0"/>
-              </a:rPr>
-              <a:t>/blogs/machine-learning/build-a-risk-management-machine-learning-workflow-on-amazon-sagemaker-with-no-code/</a:t>
-            </a:r>
+            <a:endParaRPr lang="en-US" sz="1800" kern="0" dirty="0">
+              <a:effectLst/>
+              <a:latin typeface="+mj-lt"/>
+              <a:ea typeface="Times New Roman" panose="02020603050405020304" pitchFamily="18" charset="0"/>
+              <a:cs typeface="Arial" panose="020B0604020202020204" pitchFamily="34" charset="0"/>
+            </a:endParaRPr>
           </a:p>
         </p:txBody>
       </p:sp>
@@ -2353,12 +2332,16 @@
               <a:spcAft>
                 <a:spcPts val="0"/>
               </a:spcAft>
+              <a:buFont typeface="+mj-lt"/>
               <a:buNone/>
             </a:pPr>
-            <a:endParaRPr dirty="0">
-              <a:latin typeface="Arial" panose="020B0604020202020204" pitchFamily="34" charset="0"/>
-              <a:cs typeface="Arial" panose="020B0604020202020204" pitchFamily="34" charset="0"/>
-            </a:endParaRPr>
+            <a:r>
+              <a:rPr lang="en-US" dirty="0">
+                <a:latin typeface="Arial" panose="020B0604020202020204" pitchFamily="34" charset="0"/>
+                <a:cs typeface="Arial" panose="020B0604020202020204" pitchFamily="34" charset="0"/>
+              </a:rPr>
+              <a:t>The app starts with the landing page where we welcome users and allow existing users to sign in into their accounts using email and password or new users to sign up for a new account using their full name, email, password</a:t>
+            </a:r>
           </a:p>
         </p:txBody>
       </p:sp>
@@ -2701,6 +2684,62 @@
           </a:bodyPr>
           <a:lstStyle/>
           <a:p>
+            <a:pPr marL="228600" marR="0" lvl="0" indent="-228600" algn="l" defTabSz="914400" rtl="0" eaLnBrk="1" fontAlgn="auto" latinLnBrk="0" hangingPunct="1">
+              <a:lnSpc>
+                <a:spcPct val="100000"/>
+              </a:lnSpc>
+              <a:spcBef>
+                <a:spcPts val="0"/>
+              </a:spcBef>
+              <a:spcAft>
+                <a:spcPts val="0"/>
+              </a:spcAft>
+              <a:buClr>
+                <a:srgbClr val="000000"/>
+              </a:buClr>
+              <a:buSzPts val="1100"/>
+              <a:buFont typeface="+mj-lt"/>
+              <a:buAutoNum type="arabicPeriod"/>
+              <a:tabLst/>
+              <a:defRPr/>
+            </a:pPr>
+            <a:r>
+              <a:rPr lang="en-US" dirty="0">
+                <a:latin typeface="Arial" panose="020B0604020202020204" pitchFamily="34" charset="0"/>
+                <a:cs typeface="Arial" panose="020B0604020202020204" pitchFamily="34" charset="0"/>
+              </a:rPr>
+              <a:t>Once logged in, users are taken to their dashboard. This central hub provides an overview of upcoming mowing sessions and weather updates. It's designed to keep users informed and in control of their lawn maintenance. To help users take their first step, we have a prominent "Get Started" button on the dashboard.</a:t>
+            </a:r>
+          </a:p>
+          <a:p>
+            <a:pPr marL="228600" marR="0" lvl="0" indent="-228600" algn="l" defTabSz="914400" rtl="0" eaLnBrk="1" fontAlgn="auto" latinLnBrk="0" hangingPunct="1">
+              <a:lnSpc>
+                <a:spcPct val="100000"/>
+              </a:lnSpc>
+              <a:spcBef>
+                <a:spcPts val="0"/>
+              </a:spcBef>
+              <a:spcAft>
+                <a:spcPts val="0"/>
+              </a:spcAft>
+              <a:buClr>
+                <a:srgbClr val="000000"/>
+              </a:buClr>
+              <a:buSzPts val="1100"/>
+              <a:buFont typeface="+mj-lt"/>
+              <a:buAutoNum type="arabicPeriod"/>
+              <a:tabLst/>
+              <a:defRPr/>
+            </a:pPr>
+            <a:r>
+              <a:rPr lang="en-US" dirty="0">
+                <a:latin typeface="Arial" panose="020B0604020202020204" pitchFamily="34" charset="0"/>
+                <a:cs typeface="Arial" panose="020B0604020202020204" pitchFamily="34" charset="0"/>
+              </a:rPr>
+              <a:t>By clicking it, users will navigate to  the lawn scanning instructions which provides a clear step-by-step guidance on capturing their lawn using the app  to ensure accurate lawn analysis</a:t>
+            </a:r>
+          </a:p>
+          <a:p>
             <a:pPr marL="0" lvl="0" indent="0" algn="l" rtl="0">
               <a:spcBef>
                 <a:spcPts val="0"/>
@@ -2813,15 +2852,52 @@
           </a:bodyPr>
           <a:lstStyle/>
           <a:p>
-            <a:pPr marL="0" lvl="0" indent="0" algn="l" rtl="0">
-              <a:spcBef>
-                <a:spcPts val="0"/>
-              </a:spcBef>
-              <a:spcAft>
-                <a:spcPts val="0"/>
-              </a:spcAft>
-              <a:buNone/>
+            <a:pPr marL="228600" lvl="0" indent="-228600" algn="l" rtl="0">
+              <a:spcBef>
+                <a:spcPts val="0"/>
+              </a:spcBef>
+              <a:spcAft>
+                <a:spcPts val="0"/>
+              </a:spcAft>
+              <a:buFont typeface="+mj-lt"/>
+              <a:buAutoNum type="arabicPeriod"/>
             </a:pPr>
+            <a:r>
+              <a:rPr lang="en-US" dirty="0"/>
+              <a:t>Next, we have the lawn scan page. Using the device's camera, users can scan their lawn, following the instructions provided. It's an interactive and user-friendly experience, empowering users to take control of their lawn care journey. After the scan, our advanced AI algorithms work their magic.</a:t>
+            </a:r>
+          </a:p>
+          <a:p>
+            <a:pPr marL="228600" lvl="0" indent="-228600" algn="l" rtl="0">
+              <a:spcBef>
+                <a:spcPts val="0"/>
+              </a:spcBef>
+              <a:spcAft>
+                <a:spcPts val="0"/>
+              </a:spcAft>
+              <a:buFont typeface="+mj-lt"/>
+              <a:buAutoNum type="arabicPeriod"/>
+            </a:pPr>
+            <a:r>
+              <a:rPr lang="en-US" dirty="0"/>
+              <a:t>On the  lawn info page, users are presented with comprehensive insights and analysis of their lawn. Our AI system evaluates the lawn's condition and identifies areas of concern.</a:t>
+            </a:r>
+          </a:p>
+          <a:p>
+            <a:pPr marL="228600" lvl="0" indent="-228600" algn="l" rtl="0">
+              <a:spcBef>
+                <a:spcPts val="0"/>
+              </a:spcBef>
+              <a:spcAft>
+                <a:spcPts val="0"/>
+              </a:spcAft>
+              <a:buFont typeface="+mj-lt"/>
+              <a:buAutoNum type="arabicPeriod"/>
+            </a:pPr>
+            <a:r>
+              <a:rPr lang="en-US" dirty="0"/>
+              <a:t>Next, we leverage the power of Machine Learning to suggest trusted lawn care professionals in their area. The suggested lawn care professional page utilizes intelligent algorithms to detect available professionals based on proximity and user preferences</a:t>
+            </a:r>
             <a:endParaRPr dirty="0"/>
           </a:p>
         </p:txBody>
@@ -2922,15 +2998,52 @@
           </a:bodyPr>
           <a:lstStyle/>
           <a:p>
-            <a:pPr marL="0" lvl="0" indent="0" algn="l" rtl="0">
-              <a:spcBef>
-                <a:spcPts val="0"/>
-              </a:spcBef>
-              <a:spcAft>
-                <a:spcPts val="0"/>
-              </a:spcAft>
-              <a:buNone/>
+            <a:pPr marL="228600" lvl="0" indent="-228600" algn="l" rtl="0">
+              <a:spcBef>
+                <a:spcPts val="0"/>
+              </a:spcBef>
+              <a:spcAft>
+                <a:spcPts val="0"/>
+              </a:spcAft>
+              <a:buFont typeface="+mj-lt"/>
+              <a:buAutoNum type="arabicPeriod"/>
             </a:pPr>
+            <a:r>
+              <a:rPr lang="en-US" dirty="0"/>
+              <a:t>When user is ready to schedule the service, our checkout page streamlines the process. The user-friendly interface presents a summary of the order, including the selected date, time, and total cost. Users can review and confirm their choices before proceeding. </a:t>
+            </a:r>
+          </a:p>
+          <a:p>
+            <a:pPr marL="228600" lvl="0" indent="-228600" algn="l" rtl="0">
+              <a:spcBef>
+                <a:spcPts val="0"/>
+              </a:spcBef>
+              <a:spcAft>
+                <a:spcPts val="0"/>
+              </a:spcAft>
+              <a:buFont typeface="+mj-lt"/>
+              <a:buAutoNum type="arabicPeriod"/>
+            </a:pPr>
+            <a:r>
+              <a:rPr lang="en-US" dirty="0"/>
+              <a:t>Finally, we have the confirmation page, which serves as a confirmation of the scheduled lawn mowing service. It displays the order details and provides a clear confirmation message. </a:t>
+            </a:r>
+          </a:p>
+          <a:p>
+            <a:pPr marL="228600" lvl="0" indent="-228600" algn="l" rtl="0">
+              <a:spcBef>
+                <a:spcPts val="0"/>
+              </a:spcBef>
+              <a:spcAft>
+                <a:spcPts val="0"/>
+              </a:spcAft>
+              <a:buFont typeface="+mj-lt"/>
+              <a:buAutoNum type="arabicPeriod"/>
+            </a:pPr>
+            <a:r>
+              <a:rPr lang="en-US" dirty="0"/>
+              <a:t>Additionally, a convenient ”Back to Dashboard" button is available, allowing users to quickly access their dashboard where upcoming appointments are displayed.</a:t>
+            </a:r>
             <a:endParaRPr dirty="0"/>
           </a:p>
         </p:txBody>
@@ -3031,7 +3144,7 @@
           </a:bodyPr>
           <a:lstStyle/>
           <a:p>
-            <a:pPr marL="0" marR="0" lvl="0" indent="0" algn="l" defTabSz="914400" rtl="0" eaLnBrk="1" fontAlgn="auto" latinLnBrk="0" hangingPunct="1">
+            <a:pPr marL="342900" marR="0" lvl="0" indent="-342900" algn="l" defTabSz="914400" rtl="0" eaLnBrk="1" fontAlgn="auto" latinLnBrk="0" hangingPunct="1">
               <a:lnSpc>
                 <a:spcPct val="100000"/>
               </a:lnSpc>
@@ -3045,17 +3158,290 @@
                 <a:srgbClr val="000000"/>
               </a:buClr>
               <a:buSzPts val="1100"/>
-              <a:buFont typeface="Arial"/>
-              <a:buNone/>
+              <a:buFont typeface="+mj-lt"/>
+              <a:buAutoNum type="arabicPeriod"/>
               <a:tabLst/>
               <a:defRPr/>
             </a:pPr>
-            <a:endParaRPr lang="en-US" sz="1800" kern="0" dirty="0">
-              <a:effectLst/>
-              <a:latin typeface="+mj-lt"/>
-              <a:ea typeface="Times New Roman" panose="02020603050405020304" pitchFamily="18" charset="0"/>
-              <a:cs typeface="Arial" panose="020B0604020202020204" pitchFamily="34" charset="0"/>
-            </a:endParaRPr>
+            <a:r>
+              <a:rPr lang="en-US" sz="1800" kern="0" dirty="0">
+                <a:effectLst/>
+                <a:latin typeface="+mj-lt"/>
+                <a:ea typeface="Times New Roman" panose="02020603050405020304" pitchFamily="18" charset="0"/>
+                <a:cs typeface="Arial" panose="020B0604020202020204" pitchFamily="34" charset="0"/>
+              </a:rPr>
+              <a:t>For the app flow diagram, the app begins with a landing page</a:t>
+            </a:r>
+          </a:p>
+          <a:p>
+            <a:pPr marL="342900" marR="0" lvl="0" indent="-342900" algn="l" defTabSz="914400" rtl="0" eaLnBrk="1" fontAlgn="auto" latinLnBrk="0" hangingPunct="1">
+              <a:lnSpc>
+                <a:spcPct val="100000"/>
+              </a:lnSpc>
+              <a:spcBef>
+                <a:spcPts val="0"/>
+              </a:spcBef>
+              <a:spcAft>
+                <a:spcPts val="0"/>
+              </a:spcAft>
+              <a:buClr>
+                <a:srgbClr val="000000"/>
+              </a:buClr>
+              <a:buSzPts val="1100"/>
+              <a:buFont typeface="+mj-lt"/>
+              <a:buAutoNum type="arabicPeriod"/>
+              <a:tabLst/>
+              <a:defRPr/>
+            </a:pPr>
+            <a:r>
+              <a:rPr lang="en-US" sz="1800" kern="0" dirty="0">
+                <a:effectLst/>
+                <a:latin typeface="+mj-lt"/>
+                <a:ea typeface="Times New Roman" panose="02020603050405020304" pitchFamily="18" charset="0"/>
+                <a:cs typeface="Arial" panose="020B0604020202020204" pitchFamily="34" charset="0"/>
+              </a:rPr>
+              <a:t>Moving on to the sign-in page, users can securely access their accounts. The sign-in page provides a simple and intuitive interface for users to enter their credentials and gain access to their personalized dashboard.</a:t>
+            </a:r>
+          </a:p>
+          <a:p>
+            <a:pPr marL="342900" marR="0" lvl="0" indent="-342900" algn="l" defTabSz="914400" rtl="0" eaLnBrk="1" fontAlgn="auto" latinLnBrk="0" hangingPunct="1">
+              <a:lnSpc>
+                <a:spcPct val="100000"/>
+              </a:lnSpc>
+              <a:spcBef>
+                <a:spcPts val="0"/>
+              </a:spcBef>
+              <a:spcAft>
+                <a:spcPts val="0"/>
+              </a:spcAft>
+              <a:buClr>
+                <a:srgbClr val="000000"/>
+              </a:buClr>
+              <a:buSzPts val="1100"/>
+              <a:buFont typeface="+mj-lt"/>
+              <a:buAutoNum type="arabicPeriod"/>
+              <a:tabLst/>
+              <a:defRPr/>
+            </a:pPr>
+            <a:r>
+              <a:rPr lang="en-US" sz="1800" kern="0" dirty="0">
+                <a:effectLst/>
+                <a:latin typeface="+mj-lt"/>
+                <a:ea typeface="Times New Roman" panose="02020603050405020304" pitchFamily="18" charset="0"/>
+                <a:cs typeface="Arial" panose="020B0604020202020204" pitchFamily="34" charset="0"/>
+              </a:rPr>
+              <a:t>For new users, the sign-up page offers a seamless onboarding process. Users can create their accounts by providing their details, including name, email, and password. This step opens up a world of personalized lawn care services.</a:t>
+            </a:r>
+          </a:p>
+          <a:p>
+            <a:pPr marL="342900" marR="0" lvl="0" indent="-342900" algn="l" defTabSz="914400" rtl="0" eaLnBrk="1" fontAlgn="auto" latinLnBrk="0" hangingPunct="1">
+              <a:lnSpc>
+                <a:spcPct val="100000"/>
+              </a:lnSpc>
+              <a:spcBef>
+                <a:spcPts val="0"/>
+              </a:spcBef>
+              <a:spcAft>
+                <a:spcPts val="0"/>
+              </a:spcAft>
+              <a:buClr>
+                <a:srgbClr val="000000"/>
+              </a:buClr>
+              <a:buSzPts val="1100"/>
+              <a:buFont typeface="+mj-lt"/>
+              <a:buAutoNum type="arabicPeriod"/>
+              <a:tabLst/>
+              <a:defRPr/>
+            </a:pPr>
+            <a:r>
+              <a:rPr lang="en-US" sz="1800" kern="0" dirty="0">
+                <a:effectLst/>
+                <a:latin typeface="+mj-lt"/>
+                <a:ea typeface="Times New Roman" panose="02020603050405020304" pitchFamily="18" charset="0"/>
+                <a:cs typeface="Arial" panose="020B0604020202020204" pitchFamily="34" charset="0"/>
+              </a:rPr>
+              <a:t>Once signed in, users are directed to their dashboard with a prominent "Get Started" button.</a:t>
+            </a:r>
+          </a:p>
+          <a:p>
+            <a:pPr marL="342900" marR="0" lvl="0" indent="-342900" algn="l" defTabSz="914400" rtl="0" eaLnBrk="1" fontAlgn="auto" latinLnBrk="0" hangingPunct="1">
+              <a:lnSpc>
+                <a:spcPct val="100000"/>
+              </a:lnSpc>
+              <a:spcBef>
+                <a:spcPts val="0"/>
+              </a:spcBef>
+              <a:spcAft>
+                <a:spcPts val="0"/>
+              </a:spcAft>
+              <a:buClr>
+                <a:srgbClr val="000000"/>
+              </a:buClr>
+              <a:buSzPts val="1100"/>
+              <a:buFont typeface="+mj-lt"/>
+              <a:buAutoNum type="arabicPeriod"/>
+              <a:tabLst/>
+              <a:defRPr/>
+            </a:pPr>
+            <a:r>
+              <a:rPr lang="en-US" sz="1800" kern="0" dirty="0">
+                <a:effectLst/>
+                <a:latin typeface="+mj-lt"/>
+                <a:ea typeface="Times New Roman" panose="02020603050405020304" pitchFamily="18" charset="0"/>
+                <a:cs typeface="Arial" panose="020B0604020202020204" pitchFamily="34" charset="0"/>
+              </a:rPr>
+              <a:t>To ensure accurate lawn analysis, Lawn Buddy guides users through the lawn scanning process. The lawn scanning instructions page offers step-by-step guidance on capturing their lawn using the app's camera. This enables the app to analyze the lawn and provide valuable insights.</a:t>
+            </a:r>
+          </a:p>
+          <a:p>
+            <a:pPr marL="342900" marR="0" lvl="0" indent="-342900" algn="l" defTabSz="914400" rtl="0" eaLnBrk="1" fontAlgn="auto" latinLnBrk="0" hangingPunct="1">
+              <a:lnSpc>
+                <a:spcPct val="100000"/>
+              </a:lnSpc>
+              <a:spcBef>
+                <a:spcPts val="0"/>
+              </a:spcBef>
+              <a:spcAft>
+                <a:spcPts val="0"/>
+              </a:spcAft>
+              <a:buClr>
+                <a:srgbClr val="000000"/>
+              </a:buClr>
+              <a:buSzPts val="1100"/>
+              <a:buFont typeface="+mj-lt"/>
+              <a:buAutoNum type="arabicPeriod"/>
+              <a:tabLst/>
+              <a:defRPr/>
+            </a:pPr>
+            <a:r>
+              <a:rPr lang="en-US" sz="1800" kern="0" dirty="0">
+                <a:effectLst/>
+                <a:latin typeface="+mj-lt"/>
+                <a:ea typeface="Times New Roman" panose="02020603050405020304" pitchFamily="18" charset="0"/>
+                <a:cs typeface="Arial" panose="020B0604020202020204" pitchFamily="34" charset="0"/>
+              </a:rPr>
+              <a:t>Users proceed to the lawn scan page, where they can capture their lawn using the app's camera. The app utilizes advanced AI object recognition technology to analyze the image, identifying lawn boundaries and object edges with precision.</a:t>
+            </a:r>
+          </a:p>
+          <a:p>
+            <a:pPr marL="342900" marR="0" lvl="0" indent="-342900" algn="l" defTabSz="914400" rtl="0" eaLnBrk="1" fontAlgn="auto" latinLnBrk="0" hangingPunct="1">
+              <a:lnSpc>
+                <a:spcPct val="100000"/>
+              </a:lnSpc>
+              <a:spcBef>
+                <a:spcPts val="0"/>
+              </a:spcBef>
+              <a:spcAft>
+                <a:spcPts val="0"/>
+              </a:spcAft>
+              <a:buClr>
+                <a:srgbClr val="000000"/>
+              </a:buClr>
+              <a:buSzPts val="1100"/>
+              <a:buFont typeface="+mj-lt"/>
+              <a:buAutoNum type="arabicPeriod"/>
+              <a:tabLst/>
+              <a:defRPr/>
+            </a:pPr>
+            <a:r>
+              <a:rPr lang="en-US" sz="1800" kern="0" dirty="0">
+                <a:effectLst/>
+                <a:latin typeface="+mj-lt"/>
+                <a:ea typeface="Times New Roman" panose="02020603050405020304" pitchFamily="18" charset="0"/>
+                <a:cs typeface="Arial" panose="020B0604020202020204" pitchFamily="34" charset="0"/>
+              </a:rPr>
+              <a:t>Leveraging the power of AI, Lawn Buddy's object recognition technology delivers accurate lawn scan results. The AI analyzes the captured image, identifying elements such as trees, flowerbeds, and fences. This information contributes to precise lawn measurements and enables effective lawn care recommendations.</a:t>
+            </a:r>
+          </a:p>
+          <a:p>
+            <a:pPr marL="342900" marR="0" lvl="0" indent="-342900" algn="l" defTabSz="914400" rtl="0" eaLnBrk="1" fontAlgn="auto" latinLnBrk="0" hangingPunct="1">
+              <a:lnSpc>
+                <a:spcPct val="100000"/>
+              </a:lnSpc>
+              <a:spcBef>
+                <a:spcPts val="0"/>
+              </a:spcBef>
+              <a:spcAft>
+                <a:spcPts val="0"/>
+              </a:spcAft>
+              <a:buClr>
+                <a:srgbClr val="000000"/>
+              </a:buClr>
+              <a:buSzPts val="1100"/>
+              <a:buFont typeface="+mj-lt"/>
+              <a:buAutoNum type="arabicPeriod"/>
+              <a:tabLst/>
+              <a:defRPr/>
+            </a:pPr>
+            <a:r>
+              <a:rPr lang="en-US" sz="1800" kern="0" dirty="0">
+                <a:effectLst/>
+                <a:latin typeface="+mj-lt"/>
+                <a:ea typeface="Times New Roman" panose="02020603050405020304" pitchFamily="18" charset="0"/>
+                <a:cs typeface="Arial" panose="020B0604020202020204" pitchFamily="34" charset="0"/>
+              </a:rPr>
+              <a:t>Lawn Buddy goes beyond scheduling by providing suggestions for trusted lawn care professionals. By utilizing AI, the app matches users with the most suitable professionals based on their preferences and lawn care needs. This feature ensures users have access to reliable and skilled professionals for their lawn care requirements. </a:t>
+            </a:r>
+          </a:p>
+          <a:p>
+            <a:pPr marL="342900" marR="0" lvl="0" indent="-342900" algn="l" defTabSz="914400" rtl="0" eaLnBrk="1" fontAlgn="auto" latinLnBrk="0" hangingPunct="1">
+              <a:lnSpc>
+                <a:spcPct val="100000"/>
+              </a:lnSpc>
+              <a:spcBef>
+                <a:spcPts val="0"/>
+              </a:spcBef>
+              <a:spcAft>
+                <a:spcPts val="0"/>
+              </a:spcAft>
+              <a:buClr>
+                <a:srgbClr val="000000"/>
+              </a:buClr>
+              <a:buSzPts val="1100"/>
+              <a:buFont typeface="+mj-lt"/>
+              <a:buAutoNum type="arabicPeriod"/>
+              <a:tabLst/>
+              <a:defRPr/>
+            </a:pPr>
+            <a:r>
+              <a:rPr lang="en-US" sz="1800" kern="0" dirty="0">
+                <a:effectLst/>
+                <a:latin typeface="+mj-lt"/>
+                <a:ea typeface="Times New Roman" panose="02020603050405020304" pitchFamily="18" charset="0"/>
+                <a:cs typeface="Arial" panose="020B0604020202020204" pitchFamily="34" charset="0"/>
+              </a:rPr>
+              <a:t>Then the checkout page allows users to securely make payment directly through the app. This seamless checkout experience saves time and eliminates any unnecessary hassle.</a:t>
+            </a:r>
+          </a:p>
+          <a:p>
+            <a:pPr marL="342900" marR="0" lvl="0" indent="-342900" algn="l" defTabSz="914400" rtl="0" eaLnBrk="1" fontAlgn="auto" latinLnBrk="0" hangingPunct="1">
+              <a:lnSpc>
+                <a:spcPct val="100000"/>
+              </a:lnSpc>
+              <a:spcBef>
+                <a:spcPts val="0"/>
+              </a:spcBef>
+              <a:spcAft>
+                <a:spcPts val="0"/>
+              </a:spcAft>
+              <a:buClr>
+                <a:srgbClr val="000000"/>
+              </a:buClr>
+              <a:buSzPts val="1100"/>
+              <a:buFont typeface="+mj-lt"/>
+              <a:buAutoNum type="arabicPeriod"/>
+              <a:tabLst/>
+              <a:defRPr/>
+            </a:pPr>
+            <a:r>
+              <a:rPr lang="en-US" sz="1800" kern="0" dirty="0">
+                <a:effectLst/>
+                <a:latin typeface="+mj-lt"/>
+                <a:ea typeface="Times New Roman" panose="02020603050405020304" pitchFamily="18" charset="0"/>
+                <a:cs typeface="Arial" panose="020B0604020202020204" pitchFamily="34" charset="0"/>
+              </a:rPr>
+              <a:t>After completing the checkout process, users are presented with a confirmation page. This page provides assurance that their appointment has been successfully booked. Additionally, it offers a convenient button to return to the dashboard, where users can view their upcoming appointments and track their lawn care schedule.</a:t>
+            </a:r>
           </a:p>
         </p:txBody>
       </p:sp>
@@ -18373,8 +18759,8 @@
         </p:blipFill>
         <p:spPr bwMode="auto">
           <a:xfrm>
-            <a:off x="1763662" y="1317974"/>
-            <a:ext cx="5611780" cy="3822192"/>
+            <a:off x="1976180" y="1317974"/>
+            <a:ext cx="5191640" cy="3536034"/>
           </a:xfrm>
           <a:prstGeom prst="rect">
             <a:avLst/>
@@ -18391,6 +18777,68 @@
           </a:extLst>
         </p:spPr>
       </p:pic>
+      <p:sp>
+        <p:nvSpPr>
+          <p:cNvPr id="2" name="TextBox 1">
+            <a:extLst>
+              <a:ext uri="{FF2B5EF4-FFF2-40B4-BE49-F238E27FC236}">
+                <a16:creationId xmlns:a16="http://schemas.microsoft.com/office/drawing/2014/main" id="{C8975F06-15ED-6E3E-89CC-EA0800B70686}"/>
+              </a:ext>
+            </a:extLst>
+          </p:cNvPr>
+          <p:cNvSpPr txBox="1"/>
+          <p:nvPr/>
+        </p:nvSpPr>
+        <p:spPr>
+          <a:xfrm>
+            <a:off x="258158" y="4822828"/>
+            <a:ext cx="8627683" cy="415498"/>
+          </a:xfrm>
+          <a:prstGeom prst="rect">
+            <a:avLst/>
+          </a:prstGeom>
+          <a:noFill/>
+        </p:spPr>
+        <p:txBody>
+          <a:bodyPr wrap="none" rtlCol="0">
+            <a:spAutoFit/>
+          </a:bodyPr>
+          <a:lstStyle/>
+          <a:p>
+            <a:r>
+              <a:rPr lang="en-US" sz="1050" dirty="0">
+                <a:latin typeface="Lato" panose="020F0502020204030203" pitchFamily="34" charset="0"/>
+                <a:ea typeface="Lato" panose="020F0502020204030203" pitchFamily="34" charset="0"/>
+                <a:cs typeface="Lato" panose="020F0502020204030203" pitchFamily="34" charset="0"/>
+              </a:rPr>
+              <a:t>https://</a:t>
+            </a:r>
+            <a:r>
+              <a:rPr lang="en-US" sz="1050" dirty="0" err="1">
+                <a:latin typeface="Lato" panose="020F0502020204030203" pitchFamily="34" charset="0"/>
+                <a:ea typeface="Lato" panose="020F0502020204030203" pitchFamily="34" charset="0"/>
+                <a:cs typeface="Lato" panose="020F0502020204030203" pitchFamily="34" charset="0"/>
+              </a:rPr>
+              <a:t>aws.amazon.com</a:t>
+            </a:r>
+            <a:r>
+              <a:rPr lang="en-US" sz="1050" dirty="0">
+                <a:latin typeface="Lato" panose="020F0502020204030203" pitchFamily="34" charset="0"/>
+                <a:ea typeface="Lato" panose="020F0502020204030203" pitchFamily="34" charset="0"/>
+                <a:cs typeface="Lato" panose="020F0502020204030203" pitchFamily="34" charset="0"/>
+              </a:rPr>
+              <a:t>/blogs/machine-learning/build-a-risk-management-machine-learning-workflow-on-amazon-sagemaker-with-no-code/</a:t>
+            </a:r>
+          </a:p>
+          <a:p>
+            <a:endParaRPr lang="en-US" sz="1050" dirty="0">
+              <a:latin typeface="Lato" panose="020F0502020204030203" pitchFamily="34" charset="0"/>
+              <a:ea typeface="Lato" panose="020F0502020204030203" pitchFamily="34" charset="0"/>
+              <a:cs typeface="Lato" panose="020F0502020204030203" pitchFamily="34" charset="0"/>
+            </a:endParaRPr>
+          </a:p>
+        </p:txBody>
+      </p:sp>
     </p:spTree>
     <p:custDataLst>
       <p:tags r:id="rId1"/>
@@ -23974,6 +24422,50 @@
           </p:grpSp>
         </p:grpSp>
       </p:grpSp>
+      <p:sp>
+        <p:nvSpPr>
+          <p:cNvPr id="17" name="TextBox 16">
+            <a:extLst>
+              <a:ext uri="{FF2B5EF4-FFF2-40B4-BE49-F238E27FC236}">
+                <a16:creationId xmlns:a16="http://schemas.microsoft.com/office/drawing/2014/main" id="{370952FF-45F2-25E9-78C5-BFAA75698E6F}"/>
+              </a:ext>
+            </a:extLst>
+          </p:cNvPr>
+          <p:cNvSpPr txBox="1"/>
+          <p:nvPr/>
+        </p:nvSpPr>
+        <p:spPr>
+          <a:xfrm>
+            <a:off x="2611525" y="4913450"/>
+            <a:ext cx="3802494" cy="230832"/>
+          </a:xfrm>
+          <a:prstGeom prst="rect">
+            <a:avLst/>
+          </a:prstGeom>
+          <a:noFill/>
+        </p:spPr>
+        <p:txBody>
+          <a:bodyPr wrap="square">
+            <a:spAutoFit/>
+          </a:bodyPr>
+          <a:lstStyle/>
+          <a:p>
+            <a:pPr marL="609600">
+              <a:spcBef>
+                <a:spcPts val="1000"/>
+              </a:spcBef>
+            </a:pPr>
+            <a:r>
+              <a:rPr lang="en-US" sz="900" b="1" i="1" dirty="0">
+                <a:latin typeface="Lato" panose="020F0502020204030203" pitchFamily="34" charset="0"/>
+                <a:ea typeface="Lato" panose="020F0502020204030203" pitchFamily="34" charset="0"/>
+                <a:cs typeface="Lato" panose="020F0502020204030203" pitchFamily="34" charset="0"/>
+              </a:rPr>
+              <a:t>(Description is included below in the Notes section)</a:t>
+            </a:r>
+          </a:p>
+        </p:txBody>
+      </p:sp>
     </p:spTree>
     <p:custDataLst>
       <p:tags r:id="rId1"/>
@@ -26631,6 +27123,50 @@
           </p:grpSp>
         </p:grpSp>
       </p:grpSp>
+      <p:sp>
+        <p:nvSpPr>
+          <p:cNvPr id="3" name="TextBox 2">
+            <a:extLst>
+              <a:ext uri="{FF2B5EF4-FFF2-40B4-BE49-F238E27FC236}">
+                <a16:creationId xmlns:a16="http://schemas.microsoft.com/office/drawing/2014/main" id="{96A411EE-EF19-52B8-5421-75F84B7BDE20}"/>
+              </a:ext>
+            </a:extLst>
+          </p:cNvPr>
+          <p:cNvSpPr txBox="1"/>
+          <p:nvPr/>
+        </p:nvSpPr>
+        <p:spPr>
+          <a:xfrm>
+            <a:off x="2611525" y="4913450"/>
+            <a:ext cx="3802494" cy="230832"/>
+          </a:xfrm>
+          <a:prstGeom prst="rect">
+            <a:avLst/>
+          </a:prstGeom>
+          <a:noFill/>
+        </p:spPr>
+        <p:txBody>
+          <a:bodyPr wrap="square">
+            <a:spAutoFit/>
+          </a:bodyPr>
+          <a:lstStyle/>
+          <a:p>
+            <a:pPr marL="609600">
+              <a:spcBef>
+                <a:spcPts val="1000"/>
+              </a:spcBef>
+            </a:pPr>
+            <a:r>
+              <a:rPr lang="en-US" sz="900" b="1" i="1" dirty="0">
+                <a:latin typeface="Lato" panose="020F0502020204030203" pitchFamily="34" charset="0"/>
+                <a:ea typeface="Lato" panose="020F0502020204030203" pitchFamily="34" charset="0"/>
+                <a:cs typeface="Lato" panose="020F0502020204030203" pitchFamily="34" charset="0"/>
+              </a:rPr>
+              <a:t>(Description is included below in the Notes section)</a:t>
+            </a:r>
+          </a:p>
+        </p:txBody>
+      </p:sp>
     </p:spTree>
     <p:custDataLst>
       <p:tags r:id="rId1"/>
@@ -28303,6 +28839,50 @@
           </p:grpSp>
         </p:grpSp>
       </p:grpSp>
+      <p:sp>
+        <p:nvSpPr>
+          <p:cNvPr id="3" name="TextBox 2">
+            <a:extLst>
+              <a:ext uri="{FF2B5EF4-FFF2-40B4-BE49-F238E27FC236}">
+                <a16:creationId xmlns:a16="http://schemas.microsoft.com/office/drawing/2014/main" id="{B16FF285-12BA-02CE-AA85-7F4140D7F181}"/>
+              </a:ext>
+            </a:extLst>
+          </p:cNvPr>
+          <p:cNvSpPr txBox="1"/>
+          <p:nvPr/>
+        </p:nvSpPr>
+        <p:spPr>
+          <a:xfrm>
+            <a:off x="2680747" y="4912890"/>
+            <a:ext cx="3802494" cy="230832"/>
+          </a:xfrm>
+          <a:prstGeom prst="rect">
+            <a:avLst/>
+          </a:prstGeom>
+          <a:noFill/>
+        </p:spPr>
+        <p:txBody>
+          <a:bodyPr wrap="square">
+            <a:spAutoFit/>
+          </a:bodyPr>
+          <a:lstStyle/>
+          <a:p>
+            <a:pPr marL="609600">
+              <a:spcBef>
+                <a:spcPts val="1000"/>
+              </a:spcBef>
+            </a:pPr>
+            <a:r>
+              <a:rPr lang="en-US" sz="900" b="1" i="1" dirty="0">
+                <a:latin typeface="Lato" panose="020F0502020204030203" pitchFamily="34" charset="0"/>
+                <a:ea typeface="Lato" panose="020F0502020204030203" pitchFamily="34" charset="0"/>
+                <a:cs typeface="Lato" panose="020F0502020204030203" pitchFamily="34" charset="0"/>
+              </a:rPr>
+              <a:t>(Description is included below in the Notes section)</a:t>
+            </a:r>
+          </a:p>
+        </p:txBody>
+      </p:sp>
     </p:spTree>
     <p:custDataLst>
       <p:tags r:id="rId1"/>
@@ -30767,6 +31347,50 @@
           </p:style>
         </p:cxnSp>
       </p:grpSp>
+      <p:sp>
+        <p:nvSpPr>
+          <p:cNvPr id="2" name="TextBox 1">
+            <a:extLst>
+              <a:ext uri="{FF2B5EF4-FFF2-40B4-BE49-F238E27FC236}">
+                <a16:creationId xmlns:a16="http://schemas.microsoft.com/office/drawing/2014/main" id="{7CEA2C25-0195-3C21-2ECE-34FD00845804}"/>
+              </a:ext>
+            </a:extLst>
+          </p:cNvPr>
+          <p:cNvSpPr txBox="1"/>
+          <p:nvPr/>
+        </p:nvSpPr>
+        <p:spPr>
+          <a:xfrm>
+            <a:off x="2701475" y="4928180"/>
+            <a:ext cx="3802494" cy="230832"/>
+          </a:xfrm>
+          <a:prstGeom prst="rect">
+            <a:avLst/>
+          </a:prstGeom>
+          <a:noFill/>
+        </p:spPr>
+        <p:txBody>
+          <a:bodyPr wrap="square">
+            <a:spAutoFit/>
+          </a:bodyPr>
+          <a:lstStyle/>
+          <a:p>
+            <a:pPr marL="609600">
+              <a:spcBef>
+                <a:spcPts val="1000"/>
+              </a:spcBef>
+            </a:pPr>
+            <a:r>
+              <a:rPr lang="en-US" sz="900" b="1" i="1" dirty="0">
+                <a:latin typeface="Lato" panose="020F0502020204030203" pitchFamily="34" charset="0"/>
+                <a:ea typeface="Lato" panose="020F0502020204030203" pitchFamily="34" charset="0"/>
+                <a:cs typeface="Lato" panose="020F0502020204030203" pitchFamily="34" charset="0"/>
+              </a:rPr>
+              <a:t>(Description is included below in the Notes section)</a:t>
+            </a:r>
+          </a:p>
+        </p:txBody>
+      </p:sp>
     </p:spTree>
     <p:custDataLst>
       <p:tags r:id="rId1"/>
@@ -31113,6 +31737,50 @@
           </a:prstGeom>
         </p:spPr>
       </p:pic>
+      <p:sp>
+        <p:nvSpPr>
+          <p:cNvPr id="2" name="TextBox 1">
+            <a:extLst>
+              <a:ext uri="{FF2B5EF4-FFF2-40B4-BE49-F238E27FC236}">
+                <a16:creationId xmlns:a16="http://schemas.microsoft.com/office/drawing/2014/main" id="{03202FA5-455D-46B3-E9BD-B6FB5B26D53B}"/>
+              </a:ext>
+            </a:extLst>
+          </p:cNvPr>
+          <p:cNvSpPr txBox="1"/>
+          <p:nvPr/>
+        </p:nvSpPr>
+        <p:spPr>
+          <a:xfrm>
+            <a:off x="2670753" y="4912668"/>
+            <a:ext cx="3802494" cy="230832"/>
+          </a:xfrm>
+          <a:prstGeom prst="rect">
+            <a:avLst/>
+          </a:prstGeom>
+          <a:noFill/>
+        </p:spPr>
+        <p:txBody>
+          <a:bodyPr wrap="square">
+            <a:spAutoFit/>
+          </a:bodyPr>
+          <a:lstStyle/>
+          <a:p>
+            <a:pPr marL="609600">
+              <a:spcBef>
+                <a:spcPts val="1000"/>
+              </a:spcBef>
+            </a:pPr>
+            <a:r>
+              <a:rPr lang="en-US" sz="900" b="1" i="1" dirty="0">
+                <a:latin typeface="Lato" panose="020F0502020204030203" pitchFamily="34" charset="0"/>
+                <a:ea typeface="Lato" panose="020F0502020204030203" pitchFamily="34" charset="0"/>
+                <a:cs typeface="Lato" panose="020F0502020204030203" pitchFamily="34" charset="0"/>
+              </a:rPr>
+              <a:t>(Description is included below in the Notes section)</a:t>
+            </a:r>
+          </a:p>
+        </p:txBody>
+      </p:sp>
     </p:spTree>
     <p:custDataLst>
       <p:tags r:id="rId1"/>

</xml_diff>